<commit_message>
WW first attempt at working with APIs
</commit_message>
<xml_diff>
--- a/Project_Plan/Hypotheses.pptx
+++ b/Project_Plan/Hypotheses.pptx
@@ -371,7 +371,7 @@
             <a:fld id="{190414A9-D866-4C2E-85CD-823B0F8C6A8C}" type="datetimeFigureOut">
               <a:rPr lang="en-GB" smtClean="0"/>
               <a:pPr/>
-              <a:t>24/04/2024</a:t>
+              <a:t>25/04/2024</a:t>
             </a:fld>
             <a:endParaRPr lang="en-GB" dirty="0"/>
           </a:p>
@@ -3757,7 +3757,7 @@
             </a:r>
             <a:r>
               <a:rPr lang="en-US" dirty="0"/>
-              <a:t>: Explore whether there are disparities in air quality and health outcomes across different socioeconomic groups. This could involve analyzing data on income levels, education levels, and race/ethnicity alongside air quality and health data to identify any correlations or disparities.</a:t>
+              <a:t>: Socioeconomic status, as indicated by income levels, education attainment, and race/ethnicity, is a significant predictor of air quality and health outcomes. Communities with lower socioeconomic status are hypothesized to experience poorer air quality, which in turn leads to a higher prevalence of adverse health outcomes. This relationship is expected to persist even when controlling for potential confounding variables such as geographic location and access to healthcare services.</a:t>
             </a:r>
             <a:endParaRPr lang="en-GB" dirty="0">
               <a:solidFill>
@@ -5650,8 +5650,8 @@
           </a:p>
         </p:txBody>
       </p:sp>
-      <mc:AlternateContent xmlns:mc="http://schemas.openxmlformats.org/markup-compatibility/2006">
-        <mc:Choice xmlns:p14="http://schemas.microsoft.com/office/powerpoint/2010/main" xmlns:aink="http://schemas.microsoft.com/office/drawing/2016/ink" Requires="p14 aink">
+      <mc:AlternateContent xmlns:mc="http://schemas.openxmlformats.org/markup-compatibility/2006" xmlns:p14="http://schemas.microsoft.com/office/powerpoint/2010/main" xmlns:aink="http://schemas.microsoft.com/office/drawing/2016/ink">
+        <mc:Choice Requires="p14 aink">
           <p:contentPart p14:bwMode="auto" r:id="rId6">
             <p14:nvContentPartPr>
               <p14:cNvPr id="121" name="Ink 120">
@@ -5670,7 +5670,7 @@
             </p14:xfrm>
           </p:contentPart>
         </mc:Choice>
-        <mc:Fallback>
+        <mc:Fallback xmlns="">
           <p:pic>
             <p:nvPicPr>
               <p:cNvPr id="121" name="Ink 120">
@@ -5701,8 +5701,8 @@
           </p:pic>
         </mc:Fallback>
       </mc:AlternateContent>
-      <mc:AlternateContent xmlns:mc="http://schemas.openxmlformats.org/markup-compatibility/2006">
-        <mc:Choice xmlns:p14="http://schemas.microsoft.com/office/powerpoint/2010/main" xmlns:aink="http://schemas.microsoft.com/office/drawing/2016/ink" Requires="p14 aink">
+      <mc:AlternateContent xmlns:mc="http://schemas.openxmlformats.org/markup-compatibility/2006" xmlns:p14="http://schemas.microsoft.com/office/powerpoint/2010/main" xmlns:aink="http://schemas.microsoft.com/office/drawing/2016/ink">
+        <mc:Choice Requires="p14 aink">
           <p:contentPart p14:bwMode="auto" r:id="rId8">
             <p14:nvContentPartPr>
               <p14:cNvPr id="122" name="Ink 121">
@@ -5721,7 +5721,7 @@
             </p14:xfrm>
           </p:contentPart>
         </mc:Choice>
-        <mc:Fallback>
+        <mc:Fallback xmlns="">
           <p:pic>
             <p:nvPicPr>
               <p:cNvPr id="122" name="Ink 121">
@@ -5772,8 +5772,8 @@
             <a:chExt cx="375480" cy="278640"/>
           </a:xfrm>
         </p:grpSpPr>
-        <mc:AlternateContent xmlns:mc="http://schemas.openxmlformats.org/markup-compatibility/2006">
-          <mc:Choice xmlns:p14="http://schemas.microsoft.com/office/powerpoint/2010/main" xmlns:aink="http://schemas.microsoft.com/office/drawing/2016/ink" Requires="p14 aink">
+        <mc:AlternateContent xmlns:mc="http://schemas.openxmlformats.org/markup-compatibility/2006" xmlns:p14="http://schemas.microsoft.com/office/powerpoint/2010/main" xmlns:aink="http://schemas.microsoft.com/office/drawing/2016/ink">
+          <mc:Choice Requires="p14 aink">
             <p:contentPart p14:bwMode="auto" r:id="rId10">
               <p14:nvContentPartPr>
                 <p14:cNvPr id="123" name="Ink 122">
@@ -5792,7 +5792,7 @@
               </p14:xfrm>
             </p:contentPart>
           </mc:Choice>
-          <mc:Fallback>
+          <mc:Fallback xmlns="">
             <p:pic>
               <p:nvPicPr>
                 <p:cNvPr id="123" name="Ink 122">
@@ -5823,8 +5823,8 @@
             </p:pic>
           </mc:Fallback>
         </mc:AlternateContent>
-        <mc:AlternateContent xmlns:mc="http://schemas.openxmlformats.org/markup-compatibility/2006">
-          <mc:Choice xmlns:p14="http://schemas.microsoft.com/office/powerpoint/2010/main" xmlns:aink="http://schemas.microsoft.com/office/drawing/2016/ink" Requires="p14 aink">
+        <mc:AlternateContent xmlns:mc="http://schemas.openxmlformats.org/markup-compatibility/2006" xmlns:p14="http://schemas.microsoft.com/office/powerpoint/2010/main" xmlns:aink="http://schemas.microsoft.com/office/drawing/2016/ink">
+          <mc:Choice Requires="p14 aink">
             <p:contentPart p14:bwMode="auto" r:id="rId12">
               <p14:nvContentPartPr>
                 <p14:cNvPr id="124" name="Ink 123">
@@ -5843,7 +5843,7 @@
               </p14:xfrm>
             </p:contentPart>
           </mc:Choice>
-          <mc:Fallback>
+          <mc:Fallback xmlns="">
             <p:pic>
               <p:nvPicPr>
                 <p:cNvPr id="124" name="Ink 123">
@@ -7199,6 +7199,21 @@
 </file>
 
 <file path=customXml/item1.xml><?xml version="1.0" encoding="utf-8"?>
+<?mso-contentType ?>
+<FormTemplates xmlns="http://schemas.microsoft.com/sharepoint/v3/contenttype/forms">
+  <Display>DocumentLibraryForm</Display>
+  <Edit>DocumentLibraryForm</Edit>
+  <New>DocumentLibraryForm</New>
+</FormTemplates>
+</file>
+
+<file path=customXml/item2.xml><?xml version="1.0" encoding="utf-8"?>
+<p:properties xmlns:p="http://schemas.microsoft.com/office/2006/metadata/properties" xmlns:xsi="http://www.w3.org/2001/XMLSchema-instance" xmlns:pc="http://schemas.microsoft.com/office/infopath/2007/PartnerControls">
+  <documentManagement/>
+</p:properties>
+</file>
+
+<file path=customXml/item3.xml><?xml version="1.0" encoding="utf-8"?>
 <ct:contentTypeSchema xmlns:ct="http://schemas.microsoft.com/office/2006/metadata/contentType" xmlns:ma="http://schemas.microsoft.com/office/2006/metadata/properties/metaAttributes" ct:_="" ma:_="" ma:contentTypeName="Document" ma:contentTypeID="0x010100B89738AACF687F42A1FF4B25FD833034" ma:contentTypeVersion="3" ma:contentTypeDescription="Create a new document." ma:contentTypeScope="" ma:versionID="4a8987a70cd55e9a036efe77a525cb85">
   <xsd:schema xmlns:xsd="http://www.w3.org/2001/XMLSchema" xmlns:xs="http://www.w3.org/2001/XMLSchema" xmlns:p="http://schemas.microsoft.com/office/2006/metadata/properties" xmlns:ns2="8b950644-d7c5-4f3d-a9a7-2d9862a479cb" targetNamespace="http://schemas.microsoft.com/office/2006/metadata/properties" ma:root="true" ma:fieldsID="6fecab95825f4120d91a04e913b46017" ns2:_="">
     <xsd:import namespace="8b950644-d7c5-4f3d-a9a7-2d9862a479cb"/>
@@ -7336,22 +7351,24 @@
 </ct:contentTypeSchema>
 </file>
 
-<file path=customXml/item2.xml><?xml version="1.0" encoding="utf-8"?>
-<p:properties xmlns:p="http://schemas.microsoft.com/office/2006/metadata/properties" xmlns:xsi="http://www.w3.org/2001/XMLSchema-instance" xmlns:pc="http://schemas.microsoft.com/office/infopath/2007/PartnerControls">
-  <documentManagement/>
-</p:properties>
+<file path=customXml/itemProps1.xml><?xml version="1.0" encoding="utf-8"?>
+<ds:datastoreItem xmlns:ds="http://schemas.openxmlformats.org/officeDocument/2006/customXml" ds:itemID="{167C595F-63D4-4164-AA77-13EDA9868C51}">
+  <ds:schemaRefs>
+    <ds:schemaRef ds:uri="http://schemas.microsoft.com/sharepoint/v3/contenttype/forms"/>
+  </ds:schemaRefs>
+</ds:datastoreItem>
 </file>
 
-<file path=customXml/item3.xml><?xml version="1.0" encoding="utf-8"?>
-<?mso-contentType ?>
-<FormTemplates xmlns="http://schemas.microsoft.com/sharepoint/v3/contenttype/forms">
-  <Display>DocumentLibraryForm</Display>
-  <Edit>DocumentLibraryForm</Edit>
-  <New>DocumentLibraryForm</New>
-</FormTemplates>
+<file path=customXml/itemProps2.xml><?xml version="1.0" encoding="utf-8"?>
+<ds:datastoreItem xmlns:ds="http://schemas.openxmlformats.org/officeDocument/2006/customXml" ds:itemID="{9808C16B-50FF-4AF4-8692-997DDFA1629A}">
+  <ds:schemaRefs>
+    <ds:schemaRef ds:uri="http://schemas.microsoft.com/office/2006/metadata/properties"/>
+    <ds:schemaRef ds:uri="http://schemas.microsoft.com/office/infopath/2007/PartnerControls"/>
+  </ds:schemaRefs>
+</ds:datastoreItem>
 </file>
 
-<file path=customXml/itemProps1.xml><?xml version="1.0" encoding="utf-8"?>
+<file path=customXml/itemProps3.xml><?xml version="1.0" encoding="utf-8"?>
 <ds:datastoreItem xmlns:ds="http://schemas.openxmlformats.org/officeDocument/2006/customXml" ds:itemID="{04145C9D-C086-4B8D-9369-00D6D946EB91}">
   <ds:schemaRefs>
     <ds:schemaRef ds:uri="http://schemas.microsoft.com/office/2006/metadata/contentType"/>
@@ -7367,21 +7384,4 @@
     <ds:schemaRef ds:uri="http://schemas.microsoft.com/internal/obd"/>
   </ds:schemaRefs>
 </ds:datastoreItem>
-</file>
-
-<file path=customXml/itemProps2.xml><?xml version="1.0" encoding="utf-8"?>
-<ds:datastoreItem xmlns:ds="http://schemas.openxmlformats.org/officeDocument/2006/customXml" ds:itemID="{9808C16B-50FF-4AF4-8692-997DDFA1629A}">
-  <ds:schemaRefs>
-    <ds:schemaRef ds:uri="http://schemas.microsoft.com/office/2006/metadata/properties"/>
-    <ds:schemaRef ds:uri="http://schemas.microsoft.com/office/infopath/2007/PartnerControls"/>
-  </ds:schemaRefs>
-</ds:datastoreItem>
-</file>
-
-<file path=customXml/itemProps3.xml><?xml version="1.0" encoding="utf-8"?>
-<ds:datastoreItem xmlns:ds="http://schemas.openxmlformats.org/officeDocument/2006/customXml" ds:itemID="{167C595F-63D4-4164-AA77-13EDA9868C51}">
-  <ds:schemaRefs>
-    <ds:schemaRef ds:uri="http://schemas.microsoft.com/sharepoint/v3/contenttype/forms"/>
-  </ds:schemaRefs>
-</ds:datastoreItem>
 </file>
</xml_diff>

<commit_message>
Updated the hypothesis powerpoint presentation
</commit_message>
<xml_diff>
--- a/Project_Plan/Hypotheses.pptx
+++ b/Project_Plan/Hypotheses.pptx
@@ -5,33 +5,34 @@
     <p:sldMasterId id="2147483648" r:id="rId4"/>
   </p:sldMasterIdLst>
   <p:notesMasterIdLst>
-    <p:notesMasterId r:id="rId10"/>
+    <p:notesMasterId r:id="rId11"/>
   </p:notesMasterIdLst>
   <p:sldIdLst>
     <p:sldId id="1001" r:id="rId5"/>
     <p:sldId id="999" r:id="rId6"/>
     <p:sldId id="1000" r:id="rId7"/>
     <p:sldId id="1002" r:id="rId8"/>
-    <p:sldId id="998" r:id="rId9"/>
+    <p:sldId id="1003" r:id="rId9"/>
+    <p:sldId id="998" r:id="rId10"/>
   </p:sldIdLst>
   <p:sldSz cx="9144000" cy="5143500" type="screen16x9"/>
   <p:notesSz cx="6858000" cy="9144000"/>
   <p:embeddedFontLst>
     <p:embeddedFont>
       <p:font typeface="AA Smart Sans" panose="00000500000000000000" pitchFamily="2" charset="0"/>
-      <p:regular r:id="rId11"/>
+      <p:regular r:id="rId12"/>
     </p:embeddedFont>
     <p:embeddedFont>
       <p:font typeface="AA Smart Sans Bold" panose="00000800000000000000" pitchFamily="2" charset="0"/>
-      <p:bold r:id="rId12"/>
+      <p:bold r:id="rId13"/>
     </p:embeddedFont>
     <p:embeddedFont>
       <p:font typeface="AA Smart Sans Head Light" panose="00000400000000000000" pitchFamily="2" charset="0"/>
-      <p:regular r:id="rId13"/>
+      <p:regular r:id="rId14"/>
     </p:embeddedFont>
   </p:embeddedFontLst>
   <p:custDataLst>
-    <p:tags r:id="rId14"/>
+    <p:tags r:id="rId15"/>
   </p:custDataLst>
   <p:defaultTextStyle>
     <a:defPPr>
@@ -137,6 +138,7 @@
             <p14:sldId id="999"/>
             <p14:sldId id="1000"/>
             <p14:sldId id="1002"/>
+            <p14:sldId id="1003"/>
             <p14:sldId id="998"/>
           </p14:sldIdLst>
         </p14:section>
@@ -966,6 +968,91 @@
               <a:rPr lang="en-GB" smtClean="0"/>
               <a:pPr/>
               <a:t>4</a:t>
+            </a:fld>
+            <a:endParaRPr lang="en-GB" dirty="0"/>
+          </a:p>
+        </p:txBody>
+      </p:sp>
+    </p:spTree>
+    <p:extLst>
+      <p:ext uri="{BB962C8B-B14F-4D97-AF65-F5344CB8AC3E}">
+        <p14:creationId xmlns:p14="http://schemas.microsoft.com/office/powerpoint/2010/main" val="2109697248"/>
+      </p:ext>
+    </p:extLst>
+  </p:cSld>
+  <p:clrMapOvr>
+    <a:masterClrMapping/>
+  </p:clrMapOvr>
+</p:notes>
+</file>
+
+<file path=ppt/notesSlides/notesSlide5.xml><?xml version="1.0" encoding="utf-8"?>
+<p:notes xmlns:a="http://schemas.openxmlformats.org/drawingml/2006/main" xmlns:r="http://schemas.openxmlformats.org/officeDocument/2006/relationships" xmlns:p="http://schemas.openxmlformats.org/presentationml/2006/main">
+  <p:cSld>
+    <p:spTree>
+      <p:nvGrpSpPr>
+        <p:cNvPr id="1" name=""/>
+        <p:cNvGrpSpPr/>
+        <p:nvPr/>
+      </p:nvGrpSpPr>
+      <p:grpSpPr>
+        <a:xfrm>
+          <a:off x="0" y="0"/>
+          <a:ext cx="0" cy="0"/>
+          <a:chOff x="0" y="0"/>
+          <a:chExt cx="0" cy="0"/>
+        </a:xfrm>
+      </p:grpSpPr>
+      <p:sp>
+        <p:nvSpPr>
+          <p:cNvPr id="2" name="Slide Image Placeholder 1"/>
+          <p:cNvSpPr>
+            <a:spLocks noGrp="1" noRot="1" noChangeAspect="1"/>
+          </p:cNvSpPr>
+          <p:nvPr>
+            <p:ph type="sldImg"/>
+          </p:nvPr>
+        </p:nvSpPr>
+        <p:spPr/>
+      </p:sp>
+      <p:sp>
+        <p:nvSpPr>
+          <p:cNvPr id="3" name="Notes Placeholder 2"/>
+          <p:cNvSpPr>
+            <a:spLocks noGrp="1"/>
+          </p:cNvSpPr>
+          <p:nvPr>
+            <p:ph type="body" idx="1"/>
+          </p:nvPr>
+        </p:nvSpPr>
+        <p:spPr/>
+        <p:txBody>
+          <a:bodyPr/>
+          <a:lstStyle/>
+          <a:p>
+            <a:endParaRPr lang="en-GB"/>
+          </a:p>
+        </p:txBody>
+      </p:sp>
+      <p:sp>
+        <p:nvSpPr>
+          <p:cNvPr id="4" name="Slide Number Placeholder 3"/>
+          <p:cNvSpPr>
+            <a:spLocks noGrp="1"/>
+          </p:cNvSpPr>
+          <p:nvPr>
+            <p:ph type="sldNum" sz="quarter" idx="5"/>
+          </p:nvPr>
+        </p:nvSpPr>
+        <p:spPr/>
+        <p:txBody>
+          <a:bodyPr/>
+          <a:lstStyle/>
+          <a:p>
+            <a:fld id="{95C84BFD-0690-4BA9-9BF1-8C22F67ECF6B}" type="slidenum">
+              <a:rPr lang="en-GB" smtClean="0"/>
+              <a:pPr/>
+              <a:t>5</a:t>
             </a:fld>
             <a:endParaRPr lang="en-GB" dirty="0"/>
           </a:p>
@@ -6205,6 +6292,716 @@
             </p:custDataLst>
             <p:extLst>
               <p:ext uri="{D42A27DB-BD31-4B8C-83A1-F6EECF244321}">
+                <p14:modId xmlns:p14="http://schemas.microsoft.com/office/powerpoint/2010/main" val="1071781593"/>
+              </p:ext>
+            </p:extLst>
+          </p:nvPr>
+        </p:nvGraphicFramePr>
+        <p:xfrm>
+          <a:off x="1588" y="1588"/>
+          <a:ext cx="1588" cy="1588"/>
+        </p:xfrm>
+        <a:graphic>
+          <a:graphicData uri="http://schemas.openxmlformats.org/presentationml/2006/ole">
+            <mc:AlternateContent xmlns:mc="http://schemas.openxmlformats.org/markup-compatibility/2006">
+              <mc:Choice xmlns:v="urn:schemas-microsoft-com:vml" Requires="v">
+                <p:oleObj name="think-cell Slide" r:id="rId4" imgW="392" imgH="392" progId="TCLayout.ActiveDocument.1">
+                  <p:embed/>
+                </p:oleObj>
+              </mc:Choice>
+              <mc:Fallback>
+                <p:oleObj name="think-cell Slide" r:id="rId4" imgW="392" imgH="392" progId="TCLayout.ActiveDocument.1">
+                  <p:embed/>
+                  <p:pic>
+                    <p:nvPicPr>
+                      <p:cNvPr id="4" name="think-cell data - do not delete" hidden="1">
+                        <a:extLst>
+                          <a:ext uri="{FF2B5EF4-FFF2-40B4-BE49-F238E27FC236}">
+                            <a16:creationId xmlns:a16="http://schemas.microsoft.com/office/drawing/2014/main" id="{D2E2A607-892F-6FD9-B237-0529CA001B09}"/>
+                          </a:ext>
+                        </a:extLst>
+                      </p:cNvPr>
+                      <p:cNvPicPr/>
+                      <p:nvPr/>
+                    </p:nvPicPr>
+                    <p:blipFill>
+                      <a:blip r:embed="rId5"/>
+                      <a:stretch>
+                        <a:fillRect/>
+                      </a:stretch>
+                    </p:blipFill>
+                    <p:spPr>
+                      <a:xfrm>
+                        <a:off x="1588" y="1588"/>
+                        <a:ext cx="1588" cy="1588"/>
+                      </a:xfrm>
+                      <a:prstGeom prst="rect">
+                        <a:avLst/>
+                      </a:prstGeom>
+                    </p:spPr>
+                  </p:pic>
+                </p:oleObj>
+              </mc:Fallback>
+            </mc:AlternateContent>
+          </a:graphicData>
+        </a:graphic>
+      </p:graphicFrame>
+      <p:sp>
+        <p:nvSpPr>
+          <p:cNvPr id="53" name="Text Placeholder 52">
+            <a:extLst>
+              <a:ext uri="{FF2B5EF4-FFF2-40B4-BE49-F238E27FC236}">
+                <a16:creationId xmlns:a16="http://schemas.microsoft.com/office/drawing/2014/main" id="{218D5926-0598-67DE-4211-36BD75190AE2}"/>
+              </a:ext>
+            </a:extLst>
+          </p:cNvPr>
+          <p:cNvSpPr>
+            <a:spLocks noGrp="1"/>
+          </p:cNvSpPr>
+          <p:nvPr>
+            <p:ph type="body" sz="quarter" idx="17"/>
+          </p:nvPr>
+        </p:nvSpPr>
+        <p:spPr/>
+        <p:txBody>
+          <a:bodyPr/>
+          <a:lstStyle/>
+          <a:p>
+            <a:r>
+              <a:rPr lang="en-GB" dirty="0"/>
+              <a:t>Hypothesis Formulation</a:t>
+            </a:r>
+          </a:p>
+        </p:txBody>
+      </p:sp>
+      <p:sp>
+        <p:nvSpPr>
+          <p:cNvPr id="40" name="Text Placeholder 39">
+            <a:extLst>
+              <a:ext uri="{FF2B5EF4-FFF2-40B4-BE49-F238E27FC236}">
+                <a16:creationId xmlns:a16="http://schemas.microsoft.com/office/drawing/2014/main" id="{67B6500F-5DB2-485D-6466-FE8EE478ABF4}"/>
+              </a:ext>
+            </a:extLst>
+          </p:cNvPr>
+          <p:cNvSpPr>
+            <a:spLocks noGrp="1"/>
+          </p:cNvSpPr>
+          <p:nvPr>
+            <p:ph type="body" sz="quarter" idx="23"/>
+          </p:nvPr>
+        </p:nvSpPr>
+        <p:spPr>
+          <a:xfrm>
+            <a:off x="400105" y="887120"/>
+            <a:ext cx="8344254" cy="3859505"/>
+          </a:xfrm>
+        </p:spPr>
+        <p:txBody>
+          <a:bodyPr/>
+          <a:lstStyle/>
+          <a:p>
+            <a:r>
+              <a:rPr lang="en-GB" dirty="0">
+                <a:solidFill>
+                  <a:schemeClr val="tx2">
+                    <a:lumMod val="75000"/>
+                  </a:schemeClr>
+                </a:solidFill>
+              </a:rPr>
+              <a:t>Alvin – </a:t>
+            </a:r>
+            <a:r>
+              <a:rPr lang="en-US" b="1" dirty="0">
+                <a:solidFill>
+                  <a:schemeClr val="tx2">
+                    <a:lumMod val="75000"/>
+                  </a:schemeClr>
+                </a:solidFill>
+              </a:rPr>
+              <a:t>Urban vs. Rural Health Impact Hypothesis:</a:t>
+            </a:r>
+          </a:p>
+          <a:p>
+            <a:r>
+              <a:rPr lang="en-US" dirty="0">
+                <a:solidFill>
+                  <a:schemeClr val="tx2">
+                    <a:lumMod val="75000"/>
+                  </a:schemeClr>
+                </a:solidFill>
+              </a:rPr>
+              <a:t>Urban areas with high vehicular emissions have a greater prevalence of cardiovascular diseases compared to rural areas with lower air pollutant levels.</a:t>
+            </a:r>
+          </a:p>
+          <a:p>
+            <a:pPr algn="l">
+              <a:buFont typeface="Arial" panose="020B0604020202020204" pitchFamily="34" charset="0"/>
+              <a:buChar char="•"/>
+            </a:pPr>
+            <a:r>
+              <a:rPr lang="en-US" b="1" i="0" dirty="0">
+                <a:solidFill>
+                  <a:srgbClr val="0D0D0D"/>
+                </a:solidFill>
+                <a:effectLst/>
+                <a:latin typeface="Söhne"/>
+              </a:rPr>
+              <a:t>Geographic Scope</a:t>
+            </a:r>
+            <a:r>
+              <a:rPr lang="en-US" b="0" i="0" dirty="0">
+                <a:solidFill>
+                  <a:srgbClr val="0D0D0D"/>
+                </a:solidFill>
+                <a:effectLst/>
+                <a:latin typeface="Söhne"/>
+              </a:rPr>
+              <a:t>: Range of rural and urban </a:t>
+            </a:r>
+            <a:r>
+              <a:rPr lang="en-US" b="0" i="0" dirty="0" err="1">
+                <a:solidFill>
+                  <a:srgbClr val="0D0D0D"/>
+                </a:solidFill>
+                <a:effectLst/>
+                <a:latin typeface="Söhne"/>
+              </a:rPr>
+              <a:t>centres</a:t>
+            </a:r>
+            <a:r>
+              <a:rPr lang="en-US" b="0" i="0" dirty="0">
+                <a:solidFill>
+                  <a:srgbClr val="0D0D0D"/>
+                </a:solidFill>
+                <a:effectLst/>
+                <a:latin typeface="Söhne"/>
+              </a:rPr>
+              <a:t> (first world – Australia)</a:t>
+            </a:r>
+          </a:p>
+          <a:p>
+            <a:pPr algn="l">
+              <a:buFont typeface="Arial" panose="020B0604020202020204" pitchFamily="34" charset="0"/>
+              <a:buChar char="•"/>
+            </a:pPr>
+            <a:r>
+              <a:rPr lang="en-US" b="1" i="0" dirty="0">
+                <a:solidFill>
+                  <a:srgbClr val="0D0D0D"/>
+                </a:solidFill>
+                <a:effectLst/>
+                <a:latin typeface="Söhne"/>
+              </a:rPr>
+              <a:t>Time Frame</a:t>
+            </a:r>
+            <a:r>
+              <a:rPr lang="en-US" b="0" i="0" dirty="0">
+                <a:solidFill>
+                  <a:srgbClr val="0D0D0D"/>
+                </a:solidFill>
+                <a:effectLst/>
+                <a:latin typeface="Söhne"/>
+              </a:rPr>
+              <a:t>: 1-3 years (monthly)</a:t>
+            </a:r>
+          </a:p>
+          <a:p>
+            <a:pPr algn="l">
+              <a:buFont typeface="Arial" panose="020B0604020202020204" pitchFamily="34" charset="0"/>
+              <a:buChar char="•"/>
+            </a:pPr>
+            <a:r>
+              <a:rPr lang="en-US" b="1" i="0" dirty="0">
+                <a:solidFill>
+                  <a:srgbClr val="0D0D0D"/>
+                </a:solidFill>
+                <a:effectLst/>
+                <a:latin typeface="Söhne"/>
+              </a:rPr>
+              <a:t>Causation Indicators</a:t>
+            </a:r>
+            <a:r>
+              <a:rPr lang="en-US" b="0" i="0" dirty="0">
+                <a:solidFill>
+                  <a:srgbClr val="0D0D0D"/>
+                </a:solidFill>
+                <a:effectLst/>
+                <a:latin typeface="Söhne"/>
+              </a:rPr>
+              <a:t>: CO2, SO2, PM2.5/M3, etc.</a:t>
+            </a:r>
+          </a:p>
+          <a:p>
+            <a:pPr algn="l">
+              <a:buFont typeface="Arial" panose="020B0604020202020204" pitchFamily="34" charset="0"/>
+              <a:buChar char="•"/>
+            </a:pPr>
+            <a:r>
+              <a:rPr lang="en-US" b="1" dirty="0">
+                <a:solidFill>
+                  <a:srgbClr val="0D0D0D"/>
+                </a:solidFill>
+                <a:latin typeface="Söhne"/>
+              </a:rPr>
+              <a:t>Outcomes: </a:t>
+            </a:r>
+            <a:r>
+              <a:rPr lang="en-US" dirty="0">
+                <a:solidFill>
+                  <a:srgbClr val="0D0D0D"/>
+                </a:solidFill>
+                <a:latin typeface="Söhne"/>
+              </a:rPr>
+              <a:t>Cardiovascular indicators?</a:t>
+            </a:r>
+            <a:endParaRPr lang="en-US" b="0" i="0" dirty="0">
+              <a:solidFill>
+                <a:srgbClr val="0D0D0D"/>
+              </a:solidFill>
+              <a:effectLst/>
+              <a:latin typeface="Söhne"/>
+            </a:endParaRPr>
+          </a:p>
+          <a:p>
+            <a:r>
+              <a:rPr lang="en-GB" dirty="0">
+                <a:solidFill>
+                  <a:schemeClr val="tx2">
+                    <a:lumMod val="75000"/>
+                  </a:schemeClr>
+                </a:solidFill>
+              </a:rPr>
+              <a:t>Bradley – </a:t>
+            </a:r>
+            <a:r>
+              <a:rPr lang="en-US" dirty="0"/>
+              <a:t>Investigative analysis of possible correlation between air quality and mental health outcomes such as depression, anxiety, cognitive function.</a:t>
+            </a:r>
+          </a:p>
+          <a:p>
+            <a:pPr algn="l">
+              <a:buFont typeface="Arial" panose="020B0604020202020204" pitchFamily="34" charset="0"/>
+              <a:buChar char="•"/>
+            </a:pPr>
+            <a:r>
+              <a:rPr lang="en-US" b="1" i="0" dirty="0">
+                <a:solidFill>
+                  <a:srgbClr val="0D0D0D"/>
+                </a:solidFill>
+                <a:effectLst/>
+                <a:latin typeface="Söhne"/>
+              </a:rPr>
+              <a:t>Geographic Scope</a:t>
+            </a:r>
+            <a:r>
+              <a:rPr lang="en-US" b="0" i="0" dirty="0">
+                <a:solidFill>
+                  <a:srgbClr val="0D0D0D"/>
+                </a:solidFill>
+                <a:effectLst/>
+                <a:latin typeface="Söhne"/>
+              </a:rPr>
+              <a:t>: 3-5 countries – first World, developing World etc.</a:t>
+            </a:r>
+          </a:p>
+          <a:p>
+            <a:pPr algn="l">
+              <a:buFont typeface="Arial" panose="020B0604020202020204" pitchFamily="34" charset="0"/>
+              <a:buChar char="•"/>
+            </a:pPr>
+            <a:r>
+              <a:rPr lang="en-US" b="1" i="0" dirty="0">
+                <a:solidFill>
+                  <a:srgbClr val="0D0D0D"/>
+                </a:solidFill>
+                <a:effectLst/>
+                <a:latin typeface="Söhne"/>
+              </a:rPr>
+              <a:t>Time Frame</a:t>
+            </a:r>
+            <a:r>
+              <a:rPr lang="en-US" b="0" i="0" dirty="0">
+                <a:solidFill>
+                  <a:srgbClr val="0D0D0D"/>
+                </a:solidFill>
+                <a:effectLst/>
+                <a:latin typeface="Söhne"/>
+              </a:rPr>
+              <a:t>: 2-5 (monthly)</a:t>
+            </a:r>
+          </a:p>
+          <a:p>
+            <a:pPr algn="l">
+              <a:buFont typeface="Arial" panose="020B0604020202020204" pitchFamily="34" charset="0"/>
+              <a:buChar char="•"/>
+            </a:pPr>
+            <a:r>
+              <a:rPr lang="en-US" b="1" i="0" dirty="0">
+                <a:solidFill>
+                  <a:srgbClr val="0D0D0D"/>
+                </a:solidFill>
+                <a:effectLst/>
+                <a:latin typeface="Söhne"/>
+              </a:rPr>
+              <a:t>Causation Indicators</a:t>
+            </a:r>
+            <a:r>
+              <a:rPr lang="en-US" b="0" i="0" dirty="0">
+                <a:solidFill>
+                  <a:srgbClr val="0D0D0D"/>
+                </a:solidFill>
+                <a:effectLst/>
+                <a:latin typeface="Söhne"/>
+              </a:rPr>
+              <a:t>: PM2.5/M3, NO2, etc.</a:t>
+            </a:r>
+          </a:p>
+          <a:p>
+            <a:pPr algn="l">
+              <a:buFont typeface="Arial" panose="020B0604020202020204" pitchFamily="34" charset="0"/>
+              <a:buChar char="•"/>
+            </a:pPr>
+            <a:r>
+              <a:rPr lang="en-US" b="1" dirty="0">
+                <a:solidFill>
+                  <a:srgbClr val="0D0D0D"/>
+                </a:solidFill>
+                <a:latin typeface="Söhne"/>
+              </a:rPr>
+              <a:t>Outcomes: </a:t>
+            </a:r>
+            <a:r>
+              <a:rPr lang="en-US" dirty="0">
+                <a:solidFill>
+                  <a:srgbClr val="0D0D0D"/>
+                </a:solidFill>
+                <a:latin typeface="Söhne"/>
+              </a:rPr>
+              <a:t>Focus on depression and anxiety</a:t>
+            </a:r>
+            <a:endParaRPr lang="en-US" b="0" i="0" dirty="0">
+              <a:solidFill>
+                <a:srgbClr val="0D0D0D"/>
+              </a:solidFill>
+              <a:effectLst/>
+              <a:latin typeface="Söhne"/>
+            </a:endParaRPr>
+          </a:p>
+          <a:p>
+            <a:pPr rtl="0"/>
+            <a:r>
+              <a:rPr lang="en-GB" dirty="0">
+                <a:solidFill>
+                  <a:schemeClr val="tx2">
+                    <a:lumMod val="75000"/>
+                  </a:schemeClr>
+                </a:solidFill>
+              </a:rPr>
+              <a:t>Fatema – Geospatial: </a:t>
+            </a:r>
+            <a:r>
+              <a:rPr lang="en-US" dirty="0"/>
+              <a:t>How does air quality (measured by PM2.5, PM10, AQI, etc.) impact respiratory health outcomes in a specific region?</a:t>
+            </a:r>
+          </a:p>
+          <a:p>
+            <a:pPr rtl="0"/>
+            <a:r>
+              <a:rPr lang="en-US" dirty="0"/>
+              <a:t>mostly compare to death rates / cause of death data</a:t>
+            </a:r>
+          </a:p>
+          <a:p>
+            <a:pPr algn="l">
+              <a:buFont typeface="Arial" panose="020B0604020202020204" pitchFamily="34" charset="0"/>
+              <a:buChar char="•"/>
+            </a:pPr>
+            <a:r>
+              <a:rPr lang="en-US" b="1" i="0" dirty="0">
+                <a:solidFill>
+                  <a:srgbClr val="0D0D0D"/>
+                </a:solidFill>
+                <a:effectLst/>
+                <a:latin typeface="Söhne"/>
+              </a:rPr>
+              <a:t>Geographic Scope</a:t>
+            </a:r>
+            <a:r>
+              <a:rPr lang="en-US" b="0" i="0" dirty="0">
+                <a:solidFill>
+                  <a:srgbClr val="0D0D0D"/>
+                </a:solidFill>
+                <a:effectLst/>
+                <a:latin typeface="Söhne"/>
+              </a:rPr>
+              <a:t>: 3-5 countries – first World, developing World etc.</a:t>
+            </a:r>
+          </a:p>
+          <a:p>
+            <a:pPr algn="l">
+              <a:buFont typeface="Arial" panose="020B0604020202020204" pitchFamily="34" charset="0"/>
+              <a:buChar char="•"/>
+            </a:pPr>
+            <a:r>
+              <a:rPr lang="en-US" b="1" i="0" dirty="0">
+                <a:solidFill>
+                  <a:srgbClr val="0D0D0D"/>
+                </a:solidFill>
+                <a:effectLst/>
+                <a:latin typeface="Söhne"/>
+              </a:rPr>
+              <a:t>Time Frame</a:t>
+            </a:r>
+            <a:r>
+              <a:rPr lang="en-US" b="0" i="0" dirty="0">
+                <a:solidFill>
+                  <a:srgbClr val="0D0D0D"/>
+                </a:solidFill>
+                <a:effectLst/>
+                <a:latin typeface="Söhne"/>
+              </a:rPr>
+              <a:t>: 2-3 (seasonal)</a:t>
+            </a:r>
+          </a:p>
+          <a:p>
+            <a:pPr algn="l">
+              <a:buFont typeface="Arial" panose="020B0604020202020204" pitchFamily="34" charset="0"/>
+              <a:buChar char="•"/>
+            </a:pPr>
+            <a:r>
+              <a:rPr lang="en-US" b="1" i="0" dirty="0">
+                <a:solidFill>
+                  <a:srgbClr val="0D0D0D"/>
+                </a:solidFill>
+                <a:effectLst/>
+                <a:latin typeface="Söhne"/>
+              </a:rPr>
+              <a:t>Causation Indicators</a:t>
+            </a:r>
+            <a:r>
+              <a:rPr lang="en-US" b="0" i="0" dirty="0">
+                <a:solidFill>
+                  <a:srgbClr val="0D0D0D"/>
+                </a:solidFill>
+                <a:effectLst/>
+                <a:latin typeface="Söhne"/>
+              </a:rPr>
+              <a:t>: PM2.5, PM10, AQI, etc.</a:t>
+            </a:r>
+          </a:p>
+          <a:p>
+            <a:pPr algn="l">
+              <a:buFont typeface="Arial" panose="020B0604020202020204" pitchFamily="34" charset="0"/>
+              <a:buChar char="•"/>
+            </a:pPr>
+            <a:r>
+              <a:rPr lang="en-US" b="1" dirty="0">
+                <a:solidFill>
+                  <a:srgbClr val="0D0D0D"/>
+                </a:solidFill>
+                <a:latin typeface="Söhne"/>
+              </a:rPr>
+              <a:t>Outcomes: </a:t>
+            </a:r>
+            <a:r>
+              <a:rPr lang="en-US" dirty="0">
+                <a:solidFill>
+                  <a:srgbClr val="0D0D0D"/>
+                </a:solidFill>
+                <a:latin typeface="Söhne"/>
+              </a:rPr>
+              <a:t>Chronic respiratory conditions, lower respiratory infections (symptoms)</a:t>
+            </a:r>
+            <a:endParaRPr lang="en-US" b="0" i="0" dirty="0">
+              <a:solidFill>
+                <a:srgbClr val="0D0D0D"/>
+              </a:solidFill>
+              <a:effectLst/>
+              <a:latin typeface="Söhne"/>
+            </a:endParaRPr>
+          </a:p>
+          <a:p>
+            <a:endParaRPr lang="en-GB" dirty="0">
+              <a:solidFill>
+                <a:schemeClr val="tx2">
+                  <a:lumMod val="75000"/>
+                </a:schemeClr>
+              </a:solidFill>
+            </a:endParaRPr>
+          </a:p>
+          <a:p>
+            <a:r>
+              <a:rPr lang="en-GB" b="1" u="sng" dirty="0">
+                <a:solidFill>
+                  <a:schemeClr val="tx2">
+                    <a:lumMod val="75000"/>
+                  </a:schemeClr>
+                </a:solidFill>
+              </a:rPr>
+              <a:t>Optional: </a:t>
+            </a:r>
+            <a:r>
+              <a:rPr lang="en-GB" dirty="0">
+                <a:solidFill>
+                  <a:schemeClr val="tx2">
+                    <a:lumMod val="75000"/>
+                  </a:schemeClr>
+                </a:solidFill>
+              </a:rPr>
+              <a:t>Wendy – </a:t>
+            </a:r>
+            <a:r>
+              <a:rPr lang="en-US" b="1" dirty="0"/>
+              <a:t>Socioeconomic Disparities in Air Quality and Health</a:t>
+            </a:r>
+            <a:r>
+              <a:rPr lang="en-US" dirty="0"/>
+              <a:t>: Socioeconomic status, as indicated by income levels, education attainment, and race/ethnicity, is a significant predictor of air quality and health outcomes. Communities with lower socioeconomic status are hypothesized to experience poorer air quality, which in turn leads to a higher prevalence of adverse health outcomes. This relationship is expected to persist even when controlling for potential confounding variables such as geographic location and access to healthcare services.</a:t>
+            </a:r>
+            <a:endParaRPr lang="en-GB" dirty="0">
+              <a:solidFill>
+                <a:schemeClr val="tx2">
+                  <a:lumMod val="75000"/>
+                </a:schemeClr>
+              </a:solidFill>
+            </a:endParaRPr>
+          </a:p>
+        </p:txBody>
+      </p:sp>
+      <p:sp>
+        <p:nvSpPr>
+          <p:cNvPr id="2" name="Title 1">
+            <a:extLst>
+              <a:ext uri="{FF2B5EF4-FFF2-40B4-BE49-F238E27FC236}">
+                <a16:creationId xmlns:a16="http://schemas.microsoft.com/office/drawing/2014/main" id="{F967197E-EBFA-B022-C480-9E843A4260EA}"/>
+              </a:ext>
+            </a:extLst>
+          </p:cNvPr>
+          <p:cNvSpPr>
+            <a:spLocks noGrp="1"/>
+          </p:cNvSpPr>
+          <p:nvPr>
+            <p:ph type="title"/>
+          </p:nvPr>
+        </p:nvSpPr>
+        <p:spPr>
+          <a:xfrm>
+            <a:off x="400105" y="396874"/>
+            <a:ext cx="8347021" cy="495681"/>
+          </a:xfrm>
+        </p:spPr>
+        <p:txBody>
+          <a:bodyPr vert="horz"/>
+          <a:lstStyle/>
+          <a:p>
+            <a:r>
+              <a:rPr lang="en-GB" dirty="0"/>
+              <a:t>Hypotheses - Parameters</a:t>
+            </a:r>
+          </a:p>
+        </p:txBody>
+      </p:sp>
+      <p:sp>
+        <p:nvSpPr>
+          <p:cNvPr id="6" name="Rectangle 5">
+            <a:extLst>
+              <a:ext uri="{FF2B5EF4-FFF2-40B4-BE49-F238E27FC236}">
+                <a16:creationId xmlns:a16="http://schemas.microsoft.com/office/drawing/2014/main" id="{BF23BD53-07AD-1839-FEDC-76B52FCAEBC6}"/>
+              </a:ext>
+            </a:extLst>
+          </p:cNvPr>
+          <p:cNvSpPr/>
+          <p:nvPr/>
+        </p:nvSpPr>
+        <p:spPr>
+          <a:xfrm>
+            <a:off x="5947903" y="436329"/>
+            <a:ext cx="2488475" cy="607423"/>
+          </a:xfrm>
+          <a:prstGeom prst="rect">
+            <a:avLst/>
+          </a:prstGeom>
+          <a:solidFill>
+            <a:schemeClr val="tx1"/>
+          </a:solidFill>
+          <a:ln>
+            <a:noFill/>
+          </a:ln>
+        </p:spPr>
+        <p:style>
+          <a:lnRef idx="1">
+            <a:schemeClr val="accent1"/>
+          </a:lnRef>
+          <a:fillRef idx="3">
+            <a:schemeClr val="accent1"/>
+          </a:fillRef>
+          <a:effectRef idx="2">
+            <a:schemeClr val="accent1"/>
+          </a:effectRef>
+          <a:fontRef idx="minor">
+            <a:schemeClr val="lt1"/>
+          </a:fontRef>
+        </p:style>
+        <p:txBody>
+          <a:bodyPr rtlCol="0" anchor="ctr"/>
+          <a:lstStyle/>
+          <a:p>
+            <a:pPr algn="ctr"/>
+            <a:r>
+              <a:rPr lang="en-US" dirty="0"/>
+              <a:t>As many analytes as are feasible</a:t>
+            </a:r>
+          </a:p>
+        </p:txBody>
+      </p:sp>
+    </p:spTree>
+    <p:extLst>
+      <p:ext uri="{BB962C8B-B14F-4D97-AF65-F5344CB8AC3E}">
+        <p14:creationId xmlns:p14="http://schemas.microsoft.com/office/powerpoint/2010/main" val="3445911553"/>
+      </p:ext>
+    </p:extLst>
+  </p:cSld>
+  <p:clrMapOvr>
+    <a:masterClrMapping/>
+  </p:clrMapOvr>
+</p:sld>
+</file>
+
+<file path=ppt/slides/slide6.xml><?xml version="1.0" encoding="utf-8"?>
+<p:sld xmlns:a="http://schemas.openxmlformats.org/drawingml/2006/main" xmlns:r="http://schemas.openxmlformats.org/officeDocument/2006/relationships" xmlns:p="http://schemas.openxmlformats.org/presentationml/2006/main">
+  <p:cSld>
+    <p:spTree>
+      <p:nvGrpSpPr>
+        <p:cNvPr id="1" name=""/>
+        <p:cNvGrpSpPr/>
+        <p:nvPr/>
+      </p:nvGrpSpPr>
+      <p:grpSpPr>
+        <a:xfrm>
+          <a:off x="0" y="0"/>
+          <a:ext cx="0" cy="0"/>
+          <a:chOff x="0" y="0"/>
+          <a:chExt cx="0" cy="0"/>
+        </a:xfrm>
+      </p:grpSpPr>
+      <p:graphicFrame>
+        <p:nvGraphicFramePr>
+          <p:cNvPr id="4" name="think-cell data - do not delete" hidden="1">
+            <a:extLst>
+              <a:ext uri="{FF2B5EF4-FFF2-40B4-BE49-F238E27FC236}">
+                <a16:creationId xmlns:a16="http://schemas.microsoft.com/office/drawing/2014/main" id="{D2E2A607-892F-6FD9-B237-0529CA001B09}"/>
+              </a:ext>
+            </a:extLst>
+          </p:cNvPr>
+          <p:cNvGraphicFramePr>
+            <a:graphicFrameLocks noChangeAspect="1"/>
+          </p:cNvGraphicFramePr>
+          <p:nvPr>
+            <p:custDataLst>
+              <p:tags r:id="rId1"/>
+            </p:custDataLst>
+            <p:extLst>
+              <p:ext uri="{D42A27DB-BD31-4B8C-83A1-F6EECF244321}">
                 <p14:modId xmlns:p14="http://schemas.microsoft.com/office/powerpoint/2010/main" val="1077296026"/>
               </p:ext>
             </p:extLst>
@@ -6566,6 +7363,12 @@
 </file>
 
 <file path=ppt/tags/tag7.xml><?xml version="1.0" encoding="utf-8"?>
+<p:tagLst xmlns:a="http://schemas.openxmlformats.org/drawingml/2006/main" xmlns:r="http://schemas.openxmlformats.org/officeDocument/2006/relationships" xmlns:p="http://schemas.openxmlformats.org/presentationml/2006/main">
+  <p:tag name="THINKCELLSHAPEDONOTDELETE" val="thinkcellActiveDocDoNotDelete"/>
+</p:tagLst>
+</file>
+
+<file path=ppt/tags/tag8.xml><?xml version="1.0" encoding="utf-8"?>
 <p:tagLst xmlns:a="http://schemas.openxmlformats.org/drawingml/2006/main" xmlns:r="http://schemas.openxmlformats.org/officeDocument/2006/relationships" xmlns:p="http://schemas.openxmlformats.org/presentationml/2006/main">
   <p:tag name="THINKCELLSHAPEDONOTDELETE" val="thinkcellActiveDocDoNotDelete"/>
 </p:tagLst>
@@ -7199,21 +8002,6 @@
 </file>
 
 <file path=customXml/item1.xml><?xml version="1.0" encoding="utf-8"?>
-<?mso-contentType ?>
-<FormTemplates xmlns="http://schemas.microsoft.com/sharepoint/v3/contenttype/forms">
-  <Display>DocumentLibraryForm</Display>
-  <Edit>DocumentLibraryForm</Edit>
-  <New>DocumentLibraryForm</New>
-</FormTemplates>
-</file>
-
-<file path=customXml/item2.xml><?xml version="1.0" encoding="utf-8"?>
-<p:properties xmlns:p="http://schemas.microsoft.com/office/2006/metadata/properties" xmlns:xsi="http://www.w3.org/2001/XMLSchema-instance" xmlns:pc="http://schemas.microsoft.com/office/infopath/2007/PartnerControls">
-  <documentManagement/>
-</p:properties>
-</file>
-
-<file path=customXml/item3.xml><?xml version="1.0" encoding="utf-8"?>
 <ct:contentTypeSchema xmlns:ct="http://schemas.microsoft.com/office/2006/metadata/contentType" xmlns:ma="http://schemas.microsoft.com/office/2006/metadata/properties/metaAttributes" ct:_="" ma:_="" ma:contentTypeName="Document" ma:contentTypeID="0x010100B89738AACF687F42A1FF4B25FD833034" ma:contentTypeVersion="3" ma:contentTypeDescription="Create a new document." ma:contentTypeScope="" ma:versionID="4a8987a70cd55e9a036efe77a525cb85">
   <xsd:schema xmlns:xsd="http://www.w3.org/2001/XMLSchema" xmlns:xs="http://www.w3.org/2001/XMLSchema" xmlns:p="http://schemas.microsoft.com/office/2006/metadata/properties" xmlns:ns2="8b950644-d7c5-4f3d-a9a7-2d9862a479cb" targetNamespace="http://schemas.microsoft.com/office/2006/metadata/properties" ma:root="true" ma:fieldsID="6fecab95825f4120d91a04e913b46017" ns2:_="">
     <xsd:import namespace="8b950644-d7c5-4f3d-a9a7-2d9862a479cb"/>
@@ -7351,24 +8139,22 @@
 </ct:contentTypeSchema>
 </file>
 
-<file path=customXml/itemProps1.xml><?xml version="1.0" encoding="utf-8"?>
-<ds:datastoreItem xmlns:ds="http://schemas.openxmlformats.org/officeDocument/2006/customXml" ds:itemID="{167C595F-63D4-4164-AA77-13EDA9868C51}">
-  <ds:schemaRefs>
-    <ds:schemaRef ds:uri="http://schemas.microsoft.com/sharepoint/v3/contenttype/forms"/>
-  </ds:schemaRefs>
-</ds:datastoreItem>
+<file path=customXml/item2.xml><?xml version="1.0" encoding="utf-8"?>
+<p:properties xmlns:p="http://schemas.microsoft.com/office/2006/metadata/properties" xmlns:xsi="http://www.w3.org/2001/XMLSchema-instance" xmlns:pc="http://schemas.microsoft.com/office/infopath/2007/PartnerControls">
+  <documentManagement/>
+</p:properties>
 </file>
 
-<file path=customXml/itemProps2.xml><?xml version="1.0" encoding="utf-8"?>
-<ds:datastoreItem xmlns:ds="http://schemas.openxmlformats.org/officeDocument/2006/customXml" ds:itemID="{9808C16B-50FF-4AF4-8692-997DDFA1629A}">
-  <ds:schemaRefs>
-    <ds:schemaRef ds:uri="http://schemas.microsoft.com/office/2006/metadata/properties"/>
-    <ds:schemaRef ds:uri="http://schemas.microsoft.com/office/infopath/2007/PartnerControls"/>
-  </ds:schemaRefs>
-</ds:datastoreItem>
+<file path=customXml/item3.xml><?xml version="1.0" encoding="utf-8"?>
+<?mso-contentType ?>
+<FormTemplates xmlns="http://schemas.microsoft.com/sharepoint/v3/contenttype/forms">
+  <Display>DocumentLibraryForm</Display>
+  <Edit>DocumentLibraryForm</Edit>
+  <New>DocumentLibraryForm</New>
+</FormTemplates>
 </file>
 
-<file path=customXml/itemProps3.xml><?xml version="1.0" encoding="utf-8"?>
+<file path=customXml/itemProps1.xml><?xml version="1.0" encoding="utf-8"?>
 <ds:datastoreItem xmlns:ds="http://schemas.openxmlformats.org/officeDocument/2006/customXml" ds:itemID="{04145C9D-C086-4B8D-9369-00D6D946EB91}">
   <ds:schemaRefs>
     <ds:schemaRef ds:uri="http://schemas.microsoft.com/office/2006/metadata/contentType"/>
@@ -7384,4 +8170,21 @@
     <ds:schemaRef ds:uri="http://schemas.microsoft.com/internal/obd"/>
   </ds:schemaRefs>
 </ds:datastoreItem>
+</file>
+
+<file path=customXml/itemProps2.xml><?xml version="1.0" encoding="utf-8"?>
+<ds:datastoreItem xmlns:ds="http://schemas.openxmlformats.org/officeDocument/2006/customXml" ds:itemID="{9808C16B-50FF-4AF4-8692-997DDFA1629A}">
+  <ds:schemaRefs>
+    <ds:schemaRef ds:uri="http://schemas.microsoft.com/office/2006/metadata/properties"/>
+    <ds:schemaRef ds:uri="http://schemas.microsoft.com/office/infopath/2007/PartnerControls"/>
+  </ds:schemaRefs>
+</ds:datastoreItem>
+</file>
+
+<file path=customXml/itemProps3.xml><?xml version="1.0" encoding="utf-8"?>
+<ds:datastoreItem xmlns:ds="http://schemas.openxmlformats.org/officeDocument/2006/customXml" ds:itemID="{167C595F-63D4-4164-AA77-13EDA9868C51}">
+  <ds:schemaRefs>
+    <ds:schemaRef ds:uri="http://schemas.microsoft.com/sharepoint/v3/contenttype/forms"/>
+  </ds:schemaRefs>
+</ds:datastoreItem>
 </file>
</xml_diff>

<commit_message>
Adding all seasonal analysis files - ww
</commit_message>
<xml_diff>
--- a/Project_Plan/Hypotheses.pptx
+++ b/Project_Plan/Hypotheses.pptx
@@ -373,7 +373,7 @@
             <a:fld id="{190414A9-D866-4C2E-85CD-823B0F8C6A8C}" type="datetimeFigureOut">
               <a:rPr lang="en-GB" smtClean="0"/>
               <a:pPr/>
-              <a:t>25/04/2024</a:t>
+              <a:t>04/05/2024</a:t>
             </a:fld>
             <a:endParaRPr lang="en-GB" dirty="0"/>
           </a:p>
@@ -3819,32 +3819,40 @@
           </a:p>
           <a:p>
             <a:r>
-              <a:rPr lang="en-GB" b="1" u="sng" dirty="0">
+              <a:rPr lang="en-GB" dirty="0">
                 <a:solidFill>
                   <a:schemeClr val="tx2">
                     <a:lumMod val="75000"/>
                   </a:schemeClr>
                 </a:solidFill>
               </a:rPr>
-              <a:t>Optional: </a:t>
-            </a:r>
-            <a:r>
-              <a:rPr lang="en-GB" dirty="0">
+              <a:t>Wendy – </a:t>
+            </a:r>
+            <a:r>
+              <a:rPr lang="en-US" b="1" dirty="0"/>
+              <a:t>Spatial</a:t>
+            </a:r>
+            <a:r>
+              <a:rPr lang="en-US" dirty="0"/>
+              <a:t>: Seasonal Variations Hypothesis:</a:t>
+            </a:r>
+          </a:p>
+          <a:p>
+            <a:r>
+              <a:rPr lang="en-US" dirty="0"/>
+              <a:t>There are significant fluctuations in pollutant levels across the seasons.</a:t>
+            </a:r>
+          </a:p>
+          <a:p>
+            <a:r>
+              <a:rPr lang="en-US" dirty="0">
                 <a:solidFill>
                   <a:schemeClr val="tx2">
                     <a:lumMod val="75000"/>
                   </a:schemeClr>
                 </a:solidFill>
               </a:rPr>
-              <a:t>Wendy – </a:t>
-            </a:r>
-            <a:r>
-              <a:rPr lang="en-US" b="1" dirty="0"/>
-              <a:t>Socioeconomic Disparities in Air Quality and Health</a:t>
-            </a:r>
-            <a:r>
-              <a:rPr lang="en-US" dirty="0"/>
-              <a:t>: Socioeconomic status, as indicated by income levels, education attainment, and race/ethnicity, is a significant predictor of air quality and health outcomes. Communities with lower socioeconomic status are hypothesized to experience poorer air quality, which in turn leads to a higher prevalence of adverse health outcomes. This relationship is expected to persist even when controlling for potential confounding variables such as geographic location and access to healthcare services.</a:t>
+              <a:t>There is a positive correlation between population size and pollutant levels.</a:t>
             </a:r>
             <a:endParaRPr lang="en-GB" dirty="0">
               <a:solidFill>
@@ -8001,7 +8009,33 @@
 </a:theme>
 </file>
 
+<file path=ppt/webextensions/taskpanes.xml><?xml version="1.0" encoding="utf-8"?>
+<wetp:taskpanes xmlns:wetp="http://schemas.microsoft.com/office/webextensions/taskpanes/2010/11">
+  <wetp:taskpane dockstate="right" visibility="0" width="875" row="1">
+    <wetp:webextensionref xmlns:r="http://schemas.openxmlformats.org/officeDocument/2006/relationships" r:id="rId1"/>
+  </wetp:taskpane>
+</wetp:taskpanes>
+</file>
+
+<file path=ppt/webextensions/webextension1.xml><?xml version="1.0" encoding="utf-8"?>
+<we:webextension xmlns:we="http://schemas.microsoft.com/office/webextensions/webextension/2010/11" id="{F3E4CD09-4950-4BC9-9F3E-09EA7AB2907B}">
+  <we:reference id="wa200005669" version="2.0.0.0" store="en-US" storeType="OMEX"/>
+  <we:alternateReferences>
+    <we:reference id="wa200005669" version="2.0.0.0" store="wa200005669" storeType="OMEX"/>
+  </we:alternateReferences>
+  <we:properties/>
+  <we:bindings/>
+  <we:snapshot xmlns:r="http://schemas.openxmlformats.org/officeDocument/2006/relationships"/>
+</we:webextension>
+</file>
+
 <file path=customXml/item1.xml><?xml version="1.0" encoding="utf-8"?>
+<p:properties xmlns:p="http://schemas.microsoft.com/office/2006/metadata/properties" xmlns:xsi="http://www.w3.org/2001/XMLSchema-instance" xmlns:pc="http://schemas.microsoft.com/office/infopath/2007/PartnerControls">
+  <documentManagement/>
+</p:properties>
+</file>
+
+<file path=customXml/item2.xml><?xml version="1.0" encoding="utf-8"?>
 <ct:contentTypeSchema xmlns:ct="http://schemas.microsoft.com/office/2006/metadata/contentType" xmlns:ma="http://schemas.microsoft.com/office/2006/metadata/properties/metaAttributes" ct:_="" ma:_="" ma:contentTypeName="Document" ma:contentTypeID="0x010100B89738AACF687F42A1FF4B25FD833034" ma:contentTypeVersion="3" ma:contentTypeDescription="Create a new document." ma:contentTypeScope="" ma:versionID="4a8987a70cd55e9a036efe77a525cb85">
   <xsd:schema xmlns:xsd="http://www.w3.org/2001/XMLSchema" xmlns:xs="http://www.w3.org/2001/XMLSchema" xmlns:p="http://schemas.microsoft.com/office/2006/metadata/properties" xmlns:ns2="8b950644-d7c5-4f3d-a9a7-2d9862a479cb" targetNamespace="http://schemas.microsoft.com/office/2006/metadata/properties" ma:root="true" ma:fieldsID="6fecab95825f4120d91a04e913b46017" ns2:_="">
     <xsd:import namespace="8b950644-d7c5-4f3d-a9a7-2d9862a479cb"/>
@@ -8139,12 +8173,6 @@
 </ct:contentTypeSchema>
 </file>
 
-<file path=customXml/item2.xml><?xml version="1.0" encoding="utf-8"?>
-<p:properties xmlns:p="http://schemas.microsoft.com/office/2006/metadata/properties" xmlns:xsi="http://www.w3.org/2001/XMLSchema-instance" xmlns:pc="http://schemas.microsoft.com/office/infopath/2007/PartnerControls">
-  <documentManagement/>
-</p:properties>
-</file>
-
 <file path=customXml/item3.xml><?xml version="1.0" encoding="utf-8"?>
 <?mso-contentType ?>
 <FormTemplates xmlns="http://schemas.microsoft.com/sharepoint/v3/contenttype/forms">
@@ -8155,6 +8183,15 @@
 </file>
 
 <file path=customXml/itemProps1.xml><?xml version="1.0" encoding="utf-8"?>
+<ds:datastoreItem xmlns:ds="http://schemas.openxmlformats.org/officeDocument/2006/customXml" ds:itemID="{9808C16B-50FF-4AF4-8692-997DDFA1629A}">
+  <ds:schemaRefs>
+    <ds:schemaRef ds:uri="http://schemas.microsoft.com/office/2006/metadata/properties"/>
+    <ds:schemaRef ds:uri="http://schemas.microsoft.com/office/infopath/2007/PartnerControls"/>
+  </ds:schemaRefs>
+</ds:datastoreItem>
+</file>
+
+<file path=customXml/itemProps2.xml><?xml version="1.0" encoding="utf-8"?>
 <ds:datastoreItem xmlns:ds="http://schemas.openxmlformats.org/officeDocument/2006/customXml" ds:itemID="{04145C9D-C086-4B8D-9369-00D6D946EB91}">
   <ds:schemaRefs>
     <ds:schemaRef ds:uri="http://schemas.microsoft.com/office/2006/metadata/contentType"/>
@@ -8172,15 +8209,6 @@
 </ds:datastoreItem>
 </file>
 
-<file path=customXml/itemProps2.xml><?xml version="1.0" encoding="utf-8"?>
-<ds:datastoreItem xmlns:ds="http://schemas.openxmlformats.org/officeDocument/2006/customXml" ds:itemID="{9808C16B-50FF-4AF4-8692-997DDFA1629A}">
-  <ds:schemaRefs>
-    <ds:schemaRef ds:uri="http://schemas.microsoft.com/office/2006/metadata/properties"/>
-    <ds:schemaRef ds:uri="http://schemas.microsoft.com/office/infopath/2007/PartnerControls"/>
-  </ds:schemaRefs>
-</ds:datastoreItem>
-</file>
-
 <file path=customXml/itemProps3.xml><?xml version="1.0" encoding="utf-8"?>
 <ds:datastoreItem xmlns:ds="http://schemas.openxmlformats.org/officeDocument/2006/customXml" ds:itemID="{167C595F-63D4-4164-AA77-13EDA9868C51}">
   <ds:schemaRefs>

</xml_diff>